<commit_message>
write chapter 6:revert to revision
</commit_message>
<xml_diff>
--- a/pptx/chapter-6.pptx
+++ b/pptx/chapter-6.pptx
@@ -8,6 +8,11 @@
     <p:sldId id="256" r:id="rId2"/>
     <p:sldId id="257" r:id="rId3"/>
     <p:sldId id="258" r:id="rId4"/>
+    <p:sldId id="259" r:id="rId5"/>
+    <p:sldId id="260" r:id="rId6"/>
+    <p:sldId id="261" r:id="rId7"/>
+    <p:sldId id="262" r:id="rId8"/>
+    <p:sldId id="263" r:id="rId9"/>
   </p:sldIdLst>
   <p:sldSz cx="9144000" cy="6858000" type="screen4x3"/>
   <p:notesSz cx="6858000" cy="9144000"/>
@@ -3406,6 +3411,276 @@
 </p:sld>
 </file>
 
+<file path=ppt/slides/slide4.xml><?xml version="1.0" encoding="utf-8"?>
+<p:sld xmlns:a="http://schemas.openxmlformats.org/drawingml/2006/main" xmlns:r="http://schemas.openxmlformats.org/officeDocument/2006/relationships" xmlns:p="http://schemas.openxmlformats.org/presentationml/2006/main">
+  <p:cSld>
+    <p:spTree>
+      <p:nvGrpSpPr>
+        <p:cNvPr id="1" name=""/>
+        <p:cNvGrpSpPr/>
+        <p:nvPr/>
+      </p:nvGrpSpPr>
+      <p:grpSpPr>
+        <a:xfrm>
+          <a:off x="0" y="0"/>
+          <a:ext cx="0" cy="0"/>
+          <a:chOff x="0" y="0"/>
+          <a:chExt cx="0" cy="0"/>
+        </a:xfrm>
+      </p:grpSpPr>
+      <p:pic>
+        <p:nvPicPr>
+          <p:cNvPr id="2" name="図 1"/>
+          <p:cNvPicPr>
+            <a:picLocks noChangeAspect="1"/>
+          </p:cNvPicPr>
+          <p:nvPr/>
+        </p:nvPicPr>
+        <p:blipFill>
+          <a:blip r:embed="rId2"/>
+          <a:stretch>
+            <a:fillRect/>
+          </a:stretch>
+        </p:blipFill>
+        <p:spPr>
+          <a:xfrm>
+            <a:off x="1485900" y="723900"/>
+            <a:ext cx="6172200" cy="5410200"/>
+          </a:xfrm>
+          <a:prstGeom prst="rect">
+            <a:avLst/>
+          </a:prstGeom>
+        </p:spPr>
+      </p:pic>
+    </p:spTree>
+    <p:extLst>
+      <p:ext uri="{BB962C8B-B14F-4D97-AF65-F5344CB8AC3E}">
+        <p14:creationId xmlns:p14="http://schemas.microsoft.com/office/powerpoint/2010/main" val="3037089215"/>
+      </p:ext>
+    </p:extLst>
+  </p:cSld>
+  <p:clrMapOvr>
+    <a:masterClrMapping/>
+  </p:clrMapOvr>
+</p:sld>
+</file>
+
+<file path=ppt/slides/slide5.xml><?xml version="1.0" encoding="utf-8"?>
+<p:sld xmlns:a="http://schemas.openxmlformats.org/drawingml/2006/main" xmlns:r="http://schemas.openxmlformats.org/officeDocument/2006/relationships" xmlns:p="http://schemas.openxmlformats.org/presentationml/2006/main">
+  <p:cSld>
+    <p:spTree>
+      <p:nvGrpSpPr>
+        <p:cNvPr id="1" name=""/>
+        <p:cNvGrpSpPr/>
+        <p:nvPr/>
+      </p:nvGrpSpPr>
+      <p:grpSpPr>
+        <a:xfrm>
+          <a:off x="0" y="0"/>
+          <a:ext cx="0" cy="0"/>
+          <a:chOff x="0" y="0"/>
+          <a:chExt cx="0" cy="0"/>
+        </a:xfrm>
+      </p:grpSpPr>
+      <p:pic>
+        <p:nvPicPr>
+          <p:cNvPr id="2" name="図 1"/>
+          <p:cNvPicPr>
+            <a:picLocks noChangeAspect="1"/>
+          </p:cNvPicPr>
+          <p:nvPr/>
+        </p:nvPicPr>
+        <p:blipFill>
+          <a:blip r:embed="rId2"/>
+          <a:stretch>
+            <a:fillRect/>
+          </a:stretch>
+        </p:blipFill>
+        <p:spPr>
+          <a:xfrm>
+            <a:off x="1776762" y="1819476"/>
+            <a:ext cx="5590476" cy="3219048"/>
+          </a:xfrm>
+          <a:prstGeom prst="rect">
+            <a:avLst/>
+          </a:prstGeom>
+        </p:spPr>
+      </p:pic>
+    </p:spTree>
+    <p:extLst>
+      <p:ext uri="{BB962C8B-B14F-4D97-AF65-F5344CB8AC3E}">
+        <p14:creationId xmlns:p14="http://schemas.microsoft.com/office/powerpoint/2010/main" val="4225914696"/>
+      </p:ext>
+    </p:extLst>
+  </p:cSld>
+  <p:clrMapOvr>
+    <a:masterClrMapping/>
+  </p:clrMapOvr>
+</p:sld>
+</file>
+
+<file path=ppt/slides/slide6.xml><?xml version="1.0" encoding="utf-8"?>
+<p:sld xmlns:a="http://schemas.openxmlformats.org/drawingml/2006/main" xmlns:r="http://schemas.openxmlformats.org/officeDocument/2006/relationships" xmlns:p="http://schemas.openxmlformats.org/presentationml/2006/main">
+  <p:cSld>
+    <p:spTree>
+      <p:nvGrpSpPr>
+        <p:cNvPr id="1" name=""/>
+        <p:cNvGrpSpPr/>
+        <p:nvPr/>
+      </p:nvGrpSpPr>
+      <p:grpSpPr>
+        <a:xfrm>
+          <a:off x="0" y="0"/>
+          <a:ext cx="0" cy="0"/>
+          <a:chOff x="0" y="0"/>
+          <a:chExt cx="0" cy="0"/>
+        </a:xfrm>
+      </p:grpSpPr>
+      <p:pic>
+        <p:nvPicPr>
+          <p:cNvPr id="2" name="図 1"/>
+          <p:cNvPicPr>
+            <a:picLocks noChangeAspect="1"/>
+          </p:cNvPicPr>
+          <p:nvPr/>
+        </p:nvPicPr>
+        <p:blipFill>
+          <a:blip r:embed="rId2"/>
+          <a:stretch>
+            <a:fillRect/>
+          </a:stretch>
+        </p:blipFill>
+        <p:spPr>
+          <a:xfrm>
+            <a:off x="2386012" y="1847850"/>
+            <a:ext cx="4371975" cy="3162300"/>
+          </a:xfrm>
+          <a:prstGeom prst="rect">
+            <a:avLst/>
+          </a:prstGeom>
+        </p:spPr>
+      </p:pic>
+    </p:spTree>
+    <p:extLst>
+      <p:ext uri="{BB962C8B-B14F-4D97-AF65-F5344CB8AC3E}">
+        <p14:creationId xmlns:p14="http://schemas.microsoft.com/office/powerpoint/2010/main" val="2994815665"/>
+      </p:ext>
+    </p:extLst>
+  </p:cSld>
+  <p:clrMapOvr>
+    <a:masterClrMapping/>
+  </p:clrMapOvr>
+</p:sld>
+</file>
+
+<file path=ppt/slides/slide7.xml><?xml version="1.0" encoding="utf-8"?>
+<p:sld xmlns:a="http://schemas.openxmlformats.org/drawingml/2006/main" xmlns:r="http://schemas.openxmlformats.org/officeDocument/2006/relationships" xmlns:p="http://schemas.openxmlformats.org/presentationml/2006/main">
+  <p:cSld>
+    <p:spTree>
+      <p:nvGrpSpPr>
+        <p:cNvPr id="1" name=""/>
+        <p:cNvGrpSpPr/>
+        <p:nvPr/>
+      </p:nvGrpSpPr>
+      <p:grpSpPr>
+        <a:xfrm>
+          <a:off x="0" y="0"/>
+          <a:ext cx="0" cy="0"/>
+          <a:chOff x="0" y="0"/>
+          <a:chExt cx="0" cy="0"/>
+        </a:xfrm>
+      </p:grpSpPr>
+      <p:pic>
+        <p:nvPicPr>
+          <p:cNvPr id="2" name="図 1"/>
+          <p:cNvPicPr>
+            <a:picLocks noChangeAspect="1"/>
+          </p:cNvPicPr>
+          <p:nvPr/>
+        </p:nvPicPr>
+        <p:blipFill>
+          <a:blip r:embed="rId2"/>
+          <a:stretch>
+            <a:fillRect/>
+          </a:stretch>
+        </p:blipFill>
+        <p:spPr>
+          <a:xfrm>
+            <a:off x="1395412" y="1971675"/>
+            <a:ext cx="6353175" cy="2914650"/>
+          </a:xfrm>
+          <a:prstGeom prst="rect">
+            <a:avLst/>
+          </a:prstGeom>
+        </p:spPr>
+      </p:pic>
+    </p:spTree>
+    <p:extLst>
+      <p:ext uri="{BB962C8B-B14F-4D97-AF65-F5344CB8AC3E}">
+        <p14:creationId xmlns:p14="http://schemas.microsoft.com/office/powerpoint/2010/main" val="3966249980"/>
+      </p:ext>
+    </p:extLst>
+  </p:cSld>
+  <p:clrMapOvr>
+    <a:masterClrMapping/>
+  </p:clrMapOvr>
+</p:sld>
+</file>
+
+<file path=ppt/slides/slide8.xml><?xml version="1.0" encoding="utf-8"?>
+<p:sld xmlns:a="http://schemas.openxmlformats.org/drawingml/2006/main" xmlns:r="http://schemas.openxmlformats.org/officeDocument/2006/relationships" xmlns:p="http://schemas.openxmlformats.org/presentationml/2006/main">
+  <p:cSld>
+    <p:spTree>
+      <p:nvGrpSpPr>
+        <p:cNvPr id="1" name=""/>
+        <p:cNvGrpSpPr/>
+        <p:nvPr/>
+      </p:nvGrpSpPr>
+      <p:grpSpPr>
+        <a:xfrm>
+          <a:off x="0" y="0"/>
+          <a:ext cx="0" cy="0"/>
+          <a:chOff x="0" y="0"/>
+          <a:chExt cx="0" cy="0"/>
+        </a:xfrm>
+      </p:grpSpPr>
+      <p:pic>
+        <p:nvPicPr>
+          <p:cNvPr id="2" name="図 1"/>
+          <p:cNvPicPr>
+            <a:picLocks noChangeAspect="1"/>
+          </p:cNvPicPr>
+          <p:nvPr/>
+        </p:nvPicPr>
+        <p:blipFill>
+          <a:blip r:embed="rId2"/>
+          <a:stretch>
+            <a:fillRect/>
+          </a:stretch>
+        </p:blipFill>
+        <p:spPr>
+          <a:xfrm>
+            <a:off x="1152525" y="1042987"/>
+            <a:ext cx="6838950" cy="4772025"/>
+          </a:xfrm>
+          <a:prstGeom prst="rect">
+            <a:avLst/>
+          </a:prstGeom>
+        </p:spPr>
+      </p:pic>
+    </p:spTree>
+    <p:extLst>
+      <p:ext uri="{BB962C8B-B14F-4D97-AF65-F5344CB8AC3E}">
+        <p14:creationId xmlns:p14="http://schemas.microsoft.com/office/powerpoint/2010/main" val="1135330952"/>
+      </p:ext>
+    </p:extLst>
+  </p:cSld>
+  <p:clrMapOvr>
+    <a:masterClrMapping/>
+  </p:clrMapOvr>
+</p:sld>
+</file>
+
 <file path=ppt/theme/theme1.xml><?xml version="1.0" encoding="utf-8"?>
 <a:theme xmlns:a="http://schemas.openxmlformats.org/drawingml/2006/main" name="Office テーマ">
   <a:themeElements>

</xml_diff>